<commit_message>
Se actualiza el ppt con información de la propuesta de texto
</commit_message>
<xml_diff>
--- a/Proyecto1/Proyecto 1.pptx
+++ b/Proyecto1/Proyecto 1.pptx
@@ -109,6 +109,11 @@
       </a:defRPr>
     </a:lvl9pPr>
   </p:defaultTextStyle>
+  <p:extLst>
+    <p:ext uri="{EFAFB233-063F-42B5-8137-9DF3F51BA10A}">
+      <p15:sldGuideLst xmlns:p15="http://schemas.microsoft.com/office/powerpoint/2012/main"/>
+    </p:ext>
+  </p:extLst>
 </p:presentation>
 </file>
 
@@ -261,7 +266,7 @@
           <a:p>
             <a:fld id="{326A8D08-4BBF-4B00-8968-C6228DF2EB21}" type="datetimeFigureOut">
               <a:rPr lang="en-US" smtClean="0"/>
-              <a:t>10/13/2025</a:t>
+              <a:t>10/14/2025</a:t>
             </a:fld>
             <a:endParaRPr lang="en-US"/>
           </a:p>
@@ -461,7 +466,7 @@
           <a:p>
             <a:fld id="{326A8D08-4BBF-4B00-8968-C6228DF2EB21}" type="datetimeFigureOut">
               <a:rPr lang="en-US" smtClean="0"/>
-              <a:t>10/13/2025</a:t>
+              <a:t>10/14/2025</a:t>
             </a:fld>
             <a:endParaRPr lang="en-US"/>
           </a:p>
@@ -671,7 +676,7 @@
           <a:p>
             <a:fld id="{326A8D08-4BBF-4B00-8968-C6228DF2EB21}" type="datetimeFigureOut">
               <a:rPr lang="en-US" smtClean="0"/>
-              <a:t>10/13/2025</a:t>
+              <a:t>10/14/2025</a:t>
             </a:fld>
             <a:endParaRPr lang="en-US"/>
           </a:p>
@@ -871,7 +876,7 @@
           <a:p>
             <a:fld id="{326A8D08-4BBF-4B00-8968-C6228DF2EB21}" type="datetimeFigureOut">
               <a:rPr lang="en-US" smtClean="0"/>
-              <a:t>10/13/2025</a:t>
+              <a:t>10/14/2025</a:t>
             </a:fld>
             <a:endParaRPr lang="en-US"/>
           </a:p>
@@ -1147,7 +1152,7 @@
           <a:p>
             <a:fld id="{326A8D08-4BBF-4B00-8968-C6228DF2EB21}" type="datetimeFigureOut">
               <a:rPr lang="en-US" smtClean="0"/>
-              <a:t>10/13/2025</a:t>
+              <a:t>10/14/2025</a:t>
             </a:fld>
             <a:endParaRPr lang="en-US"/>
           </a:p>
@@ -1415,7 +1420,7 @@
           <a:p>
             <a:fld id="{326A8D08-4BBF-4B00-8968-C6228DF2EB21}" type="datetimeFigureOut">
               <a:rPr lang="en-US" smtClean="0"/>
-              <a:t>10/13/2025</a:t>
+              <a:t>10/14/2025</a:t>
             </a:fld>
             <a:endParaRPr lang="en-US"/>
           </a:p>
@@ -1830,7 +1835,7 @@
           <a:p>
             <a:fld id="{326A8D08-4BBF-4B00-8968-C6228DF2EB21}" type="datetimeFigureOut">
               <a:rPr lang="en-US" smtClean="0"/>
-              <a:t>10/13/2025</a:t>
+              <a:t>10/14/2025</a:t>
             </a:fld>
             <a:endParaRPr lang="en-US"/>
           </a:p>
@@ -1972,7 +1977,7 @@
           <a:p>
             <a:fld id="{326A8D08-4BBF-4B00-8968-C6228DF2EB21}" type="datetimeFigureOut">
               <a:rPr lang="en-US" smtClean="0"/>
-              <a:t>10/13/2025</a:t>
+              <a:t>10/14/2025</a:t>
             </a:fld>
             <a:endParaRPr lang="en-US"/>
           </a:p>
@@ -2085,7 +2090,7 @@
           <a:p>
             <a:fld id="{326A8D08-4BBF-4B00-8968-C6228DF2EB21}" type="datetimeFigureOut">
               <a:rPr lang="en-US" smtClean="0"/>
-              <a:t>10/13/2025</a:t>
+              <a:t>10/14/2025</a:t>
             </a:fld>
             <a:endParaRPr lang="en-US"/>
           </a:p>
@@ -2398,7 +2403,7 @@
           <a:p>
             <a:fld id="{326A8D08-4BBF-4B00-8968-C6228DF2EB21}" type="datetimeFigureOut">
               <a:rPr lang="en-US" smtClean="0"/>
-              <a:t>10/13/2025</a:t>
+              <a:t>10/14/2025</a:t>
             </a:fld>
             <a:endParaRPr lang="en-US"/>
           </a:p>
@@ -2687,7 +2692,7 @@
           <a:p>
             <a:fld id="{326A8D08-4BBF-4B00-8968-C6228DF2EB21}" type="datetimeFigureOut">
               <a:rPr lang="en-US" smtClean="0"/>
-              <a:t>10/13/2025</a:t>
+              <a:t>10/14/2025</a:t>
             </a:fld>
             <a:endParaRPr lang="en-US"/>
           </a:p>
@@ -2930,7 +2935,7 @@
           <a:p>
             <a:fld id="{326A8D08-4BBF-4B00-8968-C6228DF2EB21}" type="datetimeFigureOut">
               <a:rPr lang="en-US" smtClean="0"/>
-              <a:t>10/13/2025</a:t>
+              <a:t>10/14/2025</a:t>
             </a:fld>
             <a:endParaRPr lang="en-US"/>
           </a:p>
@@ -4279,6 +4284,120 @@
           <a:bodyPr/>
           <a:lstStyle/>
           <a:p>
+            <a:r>
+              <a:rPr lang="es-MX" dirty="0"/>
+              <a:t>Clasificación y análisis de artículos científicos según su contenido</a:t>
+            </a:r>
+          </a:p>
+          <a:p>
+            <a:r>
+              <a:rPr lang="en-US" dirty="0"/>
+              <a:t>K-means, PCA, Spectral Clustering, Hierarchical Clustering</a:t>
+            </a:r>
+          </a:p>
+          <a:p>
+            <a:r>
+              <a:rPr lang="en-US" dirty="0" err="1"/>
+              <a:t>Silhuette</a:t>
+            </a:r>
+            <a:r>
+              <a:rPr lang="en-US" dirty="0"/>
+              <a:t> Score</a:t>
+            </a:r>
+          </a:p>
+          <a:p>
+            <a:r>
+              <a:rPr lang="en-US" dirty="0" err="1"/>
+              <a:t>Analistas</a:t>
+            </a:r>
+            <a:r>
+              <a:rPr lang="en-US" dirty="0"/>
+              <a:t> de </a:t>
+            </a:r>
+            <a:r>
+              <a:rPr lang="en-US" dirty="0" err="1"/>
+              <a:t>datos</a:t>
+            </a:r>
+            <a:r>
+              <a:rPr lang="en-US" dirty="0"/>
+              <a:t>, </a:t>
+            </a:r>
+            <a:r>
+              <a:rPr lang="en-US" dirty="0" err="1"/>
+              <a:t>medios</a:t>
+            </a:r>
+            <a:r>
+              <a:rPr lang="en-US" dirty="0"/>
+              <a:t> de </a:t>
+            </a:r>
+            <a:r>
+              <a:rPr lang="en-US" dirty="0" err="1"/>
+              <a:t>comunicación</a:t>
+            </a:r>
+            <a:r>
+              <a:rPr lang="en-US" dirty="0"/>
+              <a:t>, </a:t>
+            </a:r>
+            <a:r>
+              <a:rPr lang="en-US" dirty="0" err="1"/>
+              <a:t>instituciones</a:t>
+            </a:r>
+            <a:r>
+              <a:rPr lang="en-US" dirty="0"/>
+              <a:t> </a:t>
+            </a:r>
+            <a:r>
+              <a:rPr lang="en-US" dirty="0" err="1"/>
+              <a:t>académicas</a:t>
+            </a:r>
+            <a:r>
+              <a:rPr lang="en-US" dirty="0"/>
+              <a:t>, </a:t>
+            </a:r>
+            <a:r>
+              <a:rPr lang="en-US" dirty="0" err="1"/>
+              <a:t>deptos</a:t>
+            </a:r>
+            <a:r>
+              <a:rPr lang="en-US" dirty="0"/>
+              <a:t>. De </a:t>
+            </a:r>
+            <a:r>
+              <a:rPr lang="en-US" dirty="0" err="1"/>
+              <a:t>atención</a:t>
+            </a:r>
+            <a:r>
+              <a:rPr lang="en-US" dirty="0"/>
+              <a:t> al </a:t>
+            </a:r>
+            <a:r>
+              <a:rPr lang="en-US" dirty="0" err="1"/>
+              <a:t>cliente</a:t>
+            </a:r>
+            <a:r>
+              <a:rPr lang="en-US" dirty="0"/>
+              <a:t>, etc.</a:t>
+            </a:r>
+          </a:p>
+          <a:p>
+            <a:r>
+              <a:rPr lang="es-MX" dirty="0"/>
+              <a:t>descubrir patrones ocultos y organizar automáticamente los textos en grupos temáticos que compartan palabras o significados similares</a:t>
+            </a:r>
+          </a:p>
+          <a:p>
+            <a:r>
+              <a:rPr lang="es-MX" dirty="0" err="1"/>
+              <a:t>Scikit-learn</a:t>
+            </a:r>
+            <a:r>
+              <a:rPr lang="es-MX" dirty="0"/>
+              <a:t>, pandas, </a:t>
+            </a:r>
+            <a:r>
+              <a:rPr lang="es-MX" dirty="0" err="1"/>
+              <a:t>matplotlib</a:t>
+            </a:r>
             <a:endParaRPr lang="en-US" dirty="0"/>
           </a:p>
         </p:txBody>
@@ -4380,7 +4499,12 @@
             <p:ph idx="1"/>
           </p:nvPr>
         </p:nvSpPr>
-        <p:spPr/>
+        <p:spPr>
+          <a:xfrm>
+            <a:off x="838200" y="1297459"/>
+            <a:ext cx="10515600" cy="4879504"/>
+          </a:xfrm>
+        </p:spPr>
         <p:txBody>
           <a:bodyPr/>
           <a:lstStyle/>
@@ -4505,6 +4629,49 @@
             </a:r>
           </a:p>
           <a:p>
+            <a:r>
+              <a:rPr lang="es-MX" dirty="0" err="1"/>
+              <a:t>Scikit-Learn</a:t>
+            </a:r>
+            <a:r>
+              <a:rPr lang="es-MX" dirty="0"/>
+              <a:t>, pandas, </a:t>
+            </a:r>
+            <a:r>
+              <a:rPr lang="es-MX" dirty="0" err="1"/>
+              <a:t>numpy</a:t>
+            </a:r>
+            <a:r>
+              <a:rPr lang="es-MX" dirty="0"/>
+              <a:t>, </a:t>
+            </a:r>
+            <a:r>
+              <a:rPr lang="es-MX" dirty="0" err="1"/>
+              <a:t>Matplotlib</a:t>
+            </a:r>
+            <a:r>
+              <a:rPr lang="es-MX" dirty="0"/>
+              <a:t>, </a:t>
+            </a:r>
+            <a:r>
+              <a:rPr lang="es-MX" dirty="0" err="1"/>
+              <a:t>Seaborn</a:t>
+            </a:r>
+            <a:endParaRPr lang="es-MX" dirty="0"/>
+          </a:p>
+          <a:p>
+            <a:r>
+              <a:rPr lang="es-MX" dirty="0"/>
+              <a:t>Posibles opciones: </a:t>
+            </a:r>
+            <a:r>
+              <a:rPr lang="es-MX" dirty="0" err="1"/>
+              <a:t>Plotly</a:t>
+            </a:r>
+            <a:r>
+              <a:rPr lang="es-MX" dirty="0"/>
+              <a:t>, </a:t>
+            </a:r>
             <a:r>
               <a:rPr lang="es-MX" dirty="0" err="1"/>
               <a:t>Streamlit</a:t>

</xml_diff>